<commit_message>
Add lecture 14 and exercise 4; update end of lecture 13
</commit_message>
<xml_diff>
--- a/lectures/13-Code-Concerns.pptx
+++ b/lectures/13-Code-Concerns.pptx
@@ -29,7 +29,8 @@
     <p:sldId id="282" r:id="rId23"/>
     <p:sldId id="283" r:id="rId24"/>
     <p:sldId id="285" r:id="rId25"/>
-    <p:sldId id="261" r:id="rId26"/>
+    <p:sldId id="291" r:id="rId26"/>
+    <p:sldId id="261" r:id="rId27"/>
   </p:sldIdLst>
   <p:sldSz cx="12192000" cy="6858000"/>
   <p:notesSz cx="6858000" cy="9144000"/>
@@ -143,7 +144,7 @@
     <p1510:client id="{0B80E44D-ACB7-4742-900D-65ADBBC42BBD}" v="155" dt="2022-10-02T03:20:36.839"/>
     <p1510:client id="{41D1CD02-71B8-404B-A554-D5C28EE4DF00}" v="25" dt="2022-07-01T02:36:55.462"/>
     <p1510:client id="{5A5E994A-2979-4E06-81D3-A48B461A8630}" v="67" dt="2022-07-01T00:19:46.864"/>
-    <p1510:client id="{A51BC9AE-0C4A-4514-B95A-B30BB053D62D}" v="9237" dt="2022-10-10T20:09:32.674"/>
+    <p1510:client id="{A51BC9AE-0C4A-4514-B95A-B30BB053D62D}" v="9627" dt="2022-10-12T17:41:24.579"/>
     <p1510:client id="{A9F75593-70A5-472E-8218-5291BAE691CA}" v="11" dt="2022-10-05T20:29:37.892"/>
     <p1510:client id="{B8ABFCB1-C449-46F8-97AC-20CC32151EAB}" v="2" dt="2022-08-19T14:43:30.526"/>
     <p1510:client id="{D2FDF37B-B316-4348-AE6A-ECE86ABB1E94}" v="151" dt="2022-10-02T00:41:00.150"/>
@@ -282,7 +283,7 @@
           <a:p>
             <a:fld id="{846CE7D5-CF57-46EF-B807-FDD0502418D4}" type="datetimeFigureOut">
               <a:rPr lang="en-US" smtClean="0"/>
-              <a:t>10/10/2022</a:t>
+              <a:t>10/12/2022</a:t>
             </a:fld>
             <a:endParaRPr lang="en-US"/>
           </a:p>
@@ -452,7 +453,7 @@
           <a:p>
             <a:fld id="{846CE7D5-CF57-46EF-B807-FDD0502418D4}" type="datetimeFigureOut">
               <a:rPr lang="en-US" smtClean="0"/>
-              <a:t>10/10/2022</a:t>
+              <a:t>10/12/2022</a:t>
             </a:fld>
             <a:endParaRPr lang="en-US"/>
           </a:p>
@@ -632,7 +633,7 @@
           <a:p>
             <a:fld id="{846CE7D5-CF57-46EF-B807-FDD0502418D4}" type="datetimeFigureOut">
               <a:rPr lang="en-US" smtClean="0"/>
-              <a:t>10/10/2022</a:t>
+              <a:t>10/12/2022</a:t>
             </a:fld>
             <a:endParaRPr lang="en-US"/>
           </a:p>
@@ -802,7 +803,7 @@
           <a:p>
             <a:fld id="{846CE7D5-CF57-46EF-B807-FDD0502418D4}" type="datetimeFigureOut">
               <a:rPr lang="en-US" smtClean="0"/>
-              <a:t>10/10/2022</a:t>
+              <a:t>10/12/2022</a:t>
             </a:fld>
             <a:endParaRPr lang="en-US"/>
           </a:p>
@@ -1048,7 +1049,7 @@
           <a:p>
             <a:fld id="{846CE7D5-CF57-46EF-B807-FDD0502418D4}" type="datetimeFigureOut">
               <a:rPr lang="en-US" smtClean="0"/>
-              <a:t>10/10/2022</a:t>
+              <a:t>10/12/2022</a:t>
             </a:fld>
             <a:endParaRPr lang="en-US"/>
           </a:p>
@@ -1280,7 +1281,7 @@
           <a:p>
             <a:fld id="{846CE7D5-CF57-46EF-B807-FDD0502418D4}" type="datetimeFigureOut">
               <a:rPr lang="en-US" smtClean="0"/>
-              <a:t>10/10/2022</a:t>
+              <a:t>10/12/2022</a:t>
             </a:fld>
             <a:endParaRPr lang="en-US"/>
           </a:p>
@@ -1647,7 +1648,7 @@
           <a:p>
             <a:fld id="{846CE7D5-CF57-46EF-B807-FDD0502418D4}" type="datetimeFigureOut">
               <a:rPr lang="en-US" smtClean="0"/>
-              <a:t>10/10/2022</a:t>
+              <a:t>10/12/2022</a:t>
             </a:fld>
             <a:endParaRPr lang="en-US"/>
           </a:p>
@@ -1765,7 +1766,7 @@
           <a:p>
             <a:fld id="{846CE7D5-CF57-46EF-B807-FDD0502418D4}" type="datetimeFigureOut">
               <a:rPr lang="en-US" smtClean="0"/>
-              <a:t>10/10/2022</a:t>
+              <a:t>10/12/2022</a:t>
             </a:fld>
             <a:endParaRPr lang="en-US"/>
           </a:p>
@@ -1860,7 +1861,7 @@
           <a:p>
             <a:fld id="{846CE7D5-CF57-46EF-B807-FDD0502418D4}" type="datetimeFigureOut">
               <a:rPr lang="en-US" smtClean="0"/>
-              <a:t>10/10/2022</a:t>
+              <a:t>10/12/2022</a:t>
             </a:fld>
             <a:endParaRPr lang="en-US"/>
           </a:p>
@@ -2137,7 +2138,7 @@
           <a:p>
             <a:fld id="{846CE7D5-CF57-46EF-B807-FDD0502418D4}" type="datetimeFigureOut">
               <a:rPr lang="en-US" smtClean="0"/>
-              <a:t>10/10/2022</a:t>
+              <a:t>10/12/2022</a:t>
             </a:fld>
             <a:endParaRPr lang="en-US"/>
           </a:p>
@@ -2394,7 +2395,7 @@
           <a:p>
             <a:fld id="{846CE7D5-CF57-46EF-B807-FDD0502418D4}" type="datetimeFigureOut">
               <a:rPr lang="en-US" smtClean="0"/>
-              <a:t>10/10/2022</a:t>
+              <a:t>10/12/2022</a:t>
             </a:fld>
             <a:endParaRPr lang="en-US"/>
           </a:p>
@@ -2607,7 +2608,7 @@
           <a:p>
             <a:fld id="{846CE7D5-CF57-46EF-B807-FDD0502418D4}" type="datetimeFigureOut">
               <a:rPr lang="en-US" smtClean="0"/>
-              <a:t>10/10/2022</a:t>
+              <a:t>10/12/2022</a:t>
             </a:fld>
             <a:endParaRPr lang="en-US"/>
           </a:p>
@@ -6677,6 +6678,154 @@
           <p:cNvPr id="2" name="Title 1">
             <a:extLst>
               <a:ext uri="{FF2B5EF4-FFF2-40B4-BE49-F238E27FC236}">
+                <a16:creationId xmlns:a16="http://schemas.microsoft.com/office/drawing/2014/main" id="{A98C5EDE-41A5-2D54-34F1-97CD6011AA21}"/>
+              </a:ext>
+            </a:extLst>
+          </p:cNvPr>
+          <p:cNvSpPr>
+            <a:spLocks noGrp="1"/>
+          </p:cNvSpPr>
+          <p:nvPr>
+            <p:ph type="title"/>
+          </p:nvPr>
+        </p:nvSpPr>
+        <p:spPr/>
+        <p:txBody>
+          <a:bodyPr/>
+          <a:lstStyle/>
+          <a:p>
+            <a:r>
+              <a:rPr lang="en-US" dirty="0">
+                <a:cs typeface="Calibri Light"/>
+              </a:rPr>
+              <a:t>Summary</a:t>
+            </a:r>
+            <a:endParaRPr lang="en-US" dirty="0"/>
+          </a:p>
+        </p:txBody>
+      </p:sp>
+      <p:sp>
+        <p:nvSpPr>
+          <p:cNvPr id="3" name="Content Placeholder 2">
+            <a:extLst>
+              <a:ext uri="{FF2B5EF4-FFF2-40B4-BE49-F238E27FC236}">
+                <a16:creationId xmlns:a16="http://schemas.microsoft.com/office/drawing/2014/main" id="{B7662B2B-324C-59A0-9880-C02A78D98144}"/>
+              </a:ext>
+            </a:extLst>
+          </p:cNvPr>
+          <p:cNvSpPr>
+            <a:spLocks noGrp="1"/>
+          </p:cNvSpPr>
+          <p:nvPr>
+            <p:ph idx="1"/>
+          </p:nvPr>
+        </p:nvSpPr>
+        <p:spPr>
+          <a:xfrm>
+            <a:off x="838200" y="1825625"/>
+            <a:ext cx="10621925" cy="5033593"/>
+          </a:xfrm>
+        </p:spPr>
+        <p:txBody>
+          <a:bodyPr vert="horz" lIns="91440" tIns="45720" rIns="91440" bIns="45720" rtlCol="0" anchor="t">
+            <a:normAutofit fontScale="92500"/>
+          </a:bodyPr>
+          <a:lstStyle/>
+          <a:p>
+            <a:r>
+              <a:rPr lang="en-US" dirty="0">
+                <a:cs typeface="Calibri"/>
+              </a:rPr>
+              <a:t>Cross-cutting concerns are an inevitable feature of medium-to-large, modular software programs.</a:t>
+            </a:r>
+          </a:p>
+          <a:p>
+            <a:r>
+              <a:rPr lang="en-US" dirty="0">
+                <a:cs typeface="Calibri"/>
+              </a:rPr>
+              <a:t>These concerns address non-functional requirements, implicit requirements, software vendor policies and practices, secondary functional requirements, and occasionally even primary functional </a:t>
+            </a:r>
+            <a:r>
+              <a:rPr lang="en-US">
+                <a:cs typeface="Calibri"/>
+              </a:rPr>
+              <a:t>requirements.</a:t>
+            </a:r>
+            <a:endParaRPr lang="en-US" dirty="0">
+              <a:cs typeface="Calibri"/>
+            </a:endParaRPr>
+          </a:p>
+          <a:p>
+            <a:r>
+              <a:rPr lang="en-US" dirty="0">
+                <a:cs typeface="Calibri"/>
+              </a:rPr>
+              <a:t>It is important to understand how to implement these concerns in a way that minimizes scattering and tangling, even if they can't be eliminated entirely.</a:t>
+            </a:r>
+          </a:p>
+          <a:p>
+            <a:r>
+              <a:rPr lang="en-US" dirty="0">
+                <a:cs typeface="Calibri"/>
+              </a:rPr>
+              <a:t>Many libraries, frameworks, and languages aim to streamline these concerns, and understanding and following best practices is important</a:t>
+            </a:r>
+          </a:p>
+          <a:p>
+            <a:r>
+              <a:rPr lang="en-US" dirty="0">
+                <a:cs typeface="Calibri"/>
+              </a:rPr>
+              <a:t>These concerns have a large impact on perceived product quality as well as source code quality, and thus ease of maintenance &amp; further </a:t>
+            </a:r>
+            <a:r>
+              <a:rPr lang="en-US">
+                <a:cs typeface="Calibri"/>
+              </a:rPr>
+              <a:t>development.</a:t>
+            </a:r>
+            <a:endParaRPr lang="en-US" dirty="0">
+              <a:cs typeface="Calibri"/>
+            </a:endParaRPr>
+          </a:p>
+        </p:txBody>
+      </p:sp>
+    </p:spTree>
+    <p:extLst>
+      <p:ext uri="{BB962C8B-B14F-4D97-AF65-F5344CB8AC3E}">
+        <p14:creationId xmlns:p14="http://schemas.microsoft.com/office/powerpoint/2010/main" val="1922272550"/>
+      </p:ext>
+    </p:extLst>
+  </p:cSld>
+  <p:clrMapOvr>
+    <a:masterClrMapping/>
+  </p:clrMapOvr>
+</p:sld>
+</file>
+
+<file path=ppt/slides/slide26.xml><?xml version="1.0" encoding="utf-8"?>
+<p:sld xmlns:a="http://schemas.openxmlformats.org/drawingml/2006/main" xmlns:r="http://schemas.openxmlformats.org/officeDocument/2006/relationships" xmlns:p="http://schemas.openxmlformats.org/presentationml/2006/main">
+  <p:cSld>
+    <p:spTree>
+      <p:nvGrpSpPr>
+        <p:cNvPr id="1" name=""/>
+        <p:cNvGrpSpPr/>
+        <p:nvPr/>
+      </p:nvGrpSpPr>
+      <p:grpSpPr>
+        <a:xfrm>
+          <a:off x="0" y="0"/>
+          <a:ext cx="0" cy="0"/>
+          <a:chOff x="0" y="0"/>
+          <a:chExt cx="0" cy="0"/>
+        </a:xfrm>
+      </p:grpSpPr>
+      <p:sp>
+        <p:nvSpPr>
+          <p:cNvPr id="2" name="Title 1">
+            <a:extLst>
+              <a:ext uri="{FF2B5EF4-FFF2-40B4-BE49-F238E27FC236}">
                 <a16:creationId xmlns:a16="http://schemas.microsoft.com/office/drawing/2014/main" id="{21EA75BF-3E73-E6A9-D6FC-C6A0664C5A59}"/>
               </a:ext>
             </a:extLst>
@@ -6722,7 +6871,7 @@
         <p:spPr/>
         <p:txBody>
           <a:bodyPr vert="horz" lIns="91440" tIns="45720" rIns="91440" bIns="45720" rtlCol="0" anchor="t">
-            <a:normAutofit fontScale="92500"/>
+            <a:normAutofit fontScale="92500" lnSpcReduction="10000"/>
           </a:bodyPr>
           <a:lstStyle/>
           <a:p>
@@ -6782,7 +6931,7 @@
                 <a:cs typeface="Calibri"/>
                 <a:hlinkClick r:id="rId7"/>
               </a:rPr>
-              <a:t>Coding Standards and Techniques. JD Kilgallin et al. June 2019. Keyfactor.</a:t>
+              <a:t>Coding Standards and Techniques. Gary Galehouse, JD Kilgallin et al. June 2019.Keyfactor.</a:t>
             </a:r>
           </a:p>
           <a:p>

</xml_diff>